<commit_message>
add the junit annotation test
</commit_message>
<xml_diff>
--- a/documents/Course 1-2.pptx
+++ b/documents/Course 1-2.pptx
@@ -22,13 +22,16 @@
     <p:sldId id="266" r:id="rId16"/>
     <p:sldId id="271" r:id="rId17"/>
     <p:sldId id="273" r:id="rId18"/>
-    <p:sldId id="274" r:id="rId19"/>
-    <p:sldId id="280" r:id="rId20"/>
-    <p:sldId id="275" r:id="rId21"/>
-    <p:sldId id="276" r:id="rId22"/>
-    <p:sldId id="277" r:id="rId23"/>
-    <p:sldId id="278" r:id="rId24"/>
-    <p:sldId id="279" r:id="rId25"/>
+    <p:sldId id="281" r:id="rId19"/>
+    <p:sldId id="274" r:id="rId20"/>
+    <p:sldId id="280" r:id="rId21"/>
+    <p:sldId id="283" r:id="rId22"/>
+    <p:sldId id="275" r:id="rId23"/>
+    <p:sldId id="276" r:id="rId24"/>
+    <p:sldId id="277" r:id="rId25"/>
+    <p:sldId id="278" r:id="rId26"/>
+    <p:sldId id="279" r:id="rId27"/>
+    <p:sldId id="282" r:id="rId28"/>
   </p:sldIdLst>
   <p:sldSz cx="9144000" cy="6858000" type="screen4x3"/>
   <p:notesSz cx="6858000" cy="9144000"/>
@@ -370,7 +373,7 @@
           <a:p>
             <a:fld id="{225922D7-1ED3-904F-B321-F881A2B91019}" type="datetimeFigureOut">
               <a:rPr lang="en-US" smtClean="0"/>
-              <a:t>5/20/17</a:t>
+              <a:t>5/27/17</a:t>
             </a:fld>
             <a:endParaRPr lang="en-US"/>
           </a:p>
@@ -704,7 +707,7 @@
           <a:p>
             <a:fld id="{225922D7-1ED3-904F-B321-F881A2B91019}" type="datetimeFigureOut">
               <a:rPr lang="en-US" smtClean="0"/>
-              <a:t>5/20/17</a:t>
+              <a:t>5/27/17</a:t>
             </a:fld>
             <a:endParaRPr lang="en-US"/>
           </a:p>
@@ -943,7 +946,7 @@
           <a:p>
             <a:fld id="{225922D7-1ED3-904F-B321-F881A2B91019}" type="datetimeFigureOut">
               <a:rPr lang="en-US" smtClean="0"/>
-              <a:t>5/20/17</a:t>
+              <a:t>5/27/17</a:t>
             </a:fld>
             <a:endParaRPr lang="en-US"/>
           </a:p>
@@ -1243,7 +1246,7 @@
           <a:p>
             <a:fld id="{225922D7-1ED3-904F-B321-F881A2B91019}" type="datetimeFigureOut">
               <a:rPr lang="en-US" smtClean="0"/>
-              <a:t>5/20/17</a:t>
+              <a:t>5/27/17</a:t>
             </a:fld>
             <a:endParaRPr lang="en-US"/>
           </a:p>
@@ -1459,7 +1462,7 @@
           <a:p>
             <a:fld id="{225922D7-1ED3-904F-B321-F881A2B91019}" type="datetimeFigureOut">
               <a:rPr lang="en-US" smtClean="0"/>
-              <a:t>5/20/17</a:t>
+              <a:t>5/27/17</a:t>
             </a:fld>
             <a:endParaRPr lang="en-US"/>
           </a:p>
@@ -1819,7 +1822,7 @@
           <a:p>
             <a:fld id="{225922D7-1ED3-904F-B321-F881A2B91019}" type="datetimeFigureOut">
               <a:rPr lang="en-US" smtClean="0"/>
-              <a:t>5/20/17</a:t>
+              <a:t>5/27/17</a:t>
             </a:fld>
             <a:endParaRPr lang="en-US"/>
           </a:p>
@@ -2086,7 +2089,7 @@
           <a:p>
             <a:fld id="{225922D7-1ED3-904F-B321-F881A2B91019}" type="datetimeFigureOut">
               <a:rPr lang="en-US" smtClean="0"/>
-              <a:t>5/20/17</a:t>
+              <a:t>5/27/17</a:t>
             </a:fld>
             <a:endParaRPr lang="en-US"/>
           </a:p>
@@ -2176,7 +2179,7 @@
           <a:p>
             <a:fld id="{225922D7-1ED3-904F-B321-F881A2B91019}" type="datetimeFigureOut">
               <a:rPr lang="en-US" smtClean="0"/>
-              <a:t>5/20/17</a:t>
+              <a:t>5/27/17</a:t>
             </a:fld>
             <a:endParaRPr lang="en-US"/>
           </a:p>
@@ -2477,7 +2480,7 @@
           <a:p>
             <a:fld id="{225922D7-1ED3-904F-B321-F881A2B91019}" type="datetimeFigureOut">
               <a:rPr lang="en-US" smtClean="0"/>
-              <a:t>5/20/17</a:t>
+              <a:t>5/27/17</a:t>
             </a:fld>
             <a:endParaRPr lang="en-US"/>
           </a:p>
@@ -2783,7 +2786,7 @@
           <a:p>
             <a:fld id="{225922D7-1ED3-904F-B321-F881A2B91019}" type="datetimeFigureOut">
               <a:rPr lang="en-US" smtClean="0"/>
-              <a:t>5/20/17</a:t>
+              <a:t>5/27/17</a:t>
             </a:fld>
             <a:endParaRPr lang="en-US"/>
           </a:p>
@@ -3063,7 +3066,7 @@
           <a:p>
             <a:fld id="{225922D7-1ED3-904F-B321-F881A2B91019}" type="datetimeFigureOut">
               <a:rPr lang="en-US" smtClean="0"/>
-              <a:t>5/20/17</a:t>
+              <a:t>5/27/17</a:t>
             </a:fld>
             <a:endParaRPr lang="en-US"/>
           </a:p>
@@ -3471,7 +3474,7 @@
           <a:p>
             <a:fld id="{225922D7-1ED3-904F-B321-F881A2B91019}" type="datetimeFigureOut">
               <a:rPr lang="en-US" smtClean="0"/>
-              <a:t>5/20/17</a:t>
+              <a:t>5/27/17</a:t>
             </a:fld>
             <a:endParaRPr lang="en-US"/>
           </a:p>
@@ -4031,7 +4034,7 @@
           <a:p>
             <a:fld id="{225922D7-1ED3-904F-B321-F881A2B91019}" type="datetimeFigureOut">
               <a:rPr lang="en-US" smtClean="0"/>
-              <a:t>5/20/17</a:t>
+              <a:t>5/27/17</a:t>
             </a:fld>
             <a:endParaRPr lang="en-US"/>
           </a:p>
@@ -4179,7 +4182,7 @@
           <a:p>
             <a:fld id="{225922D7-1ED3-904F-B321-F881A2B91019}" type="datetimeFigureOut">
               <a:rPr lang="en-US" smtClean="0"/>
-              <a:t>5/20/17</a:t>
+              <a:t>5/27/17</a:t>
             </a:fld>
             <a:endParaRPr lang="en-US"/>
           </a:p>
@@ -4269,7 +4272,7 @@
           <a:p>
             <a:fld id="{225922D7-1ED3-904F-B321-F881A2B91019}" type="datetimeFigureOut">
               <a:rPr lang="en-US" smtClean="0"/>
-              <a:t>5/20/17</a:t>
+              <a:t>5/27/17</a:t>
             </a:fld>
             <a:endParaRPr lang="en-US"/>
           </a:p>
@@ -4611,7 +4614,7 @@
           <a:p>
             <a:fld id="{225922D7-1ED3-904F-B321-F881A2B91019}" type="datetimeFigureOut">
               <a:rPr lang="en-US" smtClean="0"/>
-              <a:t>5/20/17</a:t>
+              <a:t>5/27/17</a:t>
             </a:fld>
             <a:endParaRPr lang="en-US"/>
           </a:p>
@@ -4820,7 +4823,7 @@
           <a:p>
             <a:fld id="{225922D7-1ED3-904F-B321-F881A2B91019}" type="datetimeFigureOut">
               <a:rPr lang="en-US" smtClean="0"/>
-              <a:t>5/20/17</a:t>
+              <a:t>5/27/17</a:t>
             </a:fld>
             <a:endParaRPr lang="en-US"/>
           </a:p>
@@ -6339,7 +6342,9 @@
         </p:nvSpPr>
         <p:spPr/>
         <p:txBody>
-          <a:bodyPr/>
+          <a:bodyPr>
+            <a:normAutofit fontScale="92500" lnSpcReduction="10000"/>
+          </a:bodyPr>
           <a:lstStyle/>
           <a:p>
             <a:r>
@@ -6348,7 +6353,57 @@
             </a:r>
           </a:p>
           <a:p>
-            <a:endParaRPr lang="en-CA" dirty="0"/>
+            <a:r>
+              <a:rPr lang="en-US" dirty="0"/>
+              <a:t>@</a:t>
+            </a:r>
+            <a:r>
+              <a:rPr lang="en-US" dirty="0" err="1"/>
+              <a:t>BeforeClass</a:t>
+            </a:r>
+            <a:r>
+              <a:rPr lang="en-US" dirty="0"/>
+              <a:t> – Run once before any of the test methods in the class, public static void</a:t>
+            </a:r>
+          </a:p>
+          <a:p>
+            <a:r>
+              <a:rPr lang="en-US" dirty="0"/>
+              <a:t>@</a:t>
+            </a:r>
+            <a:r>
+              <a:rPr lang="en-US" dirty="0" err="1"/>
+              <a:t>AfterClass</a:t>
+            </a:r>
+            <a:r>
+              <a:rPr lang="en-US" dirty="0"/>
+              <a:t> – Run once after all the tests in the class have been run, public static void</a:t>
+            </a:r>
+          </a:p>
+          <a:p>
+            <a:r>
+              <a:rPr lang="en-US" dirty="0"/>
+              <a:t>@Before – Run before @Test, public void</a:t>
+            </a:r>
+          </a:p>
+          <a:p>
+            <a:r>
+              <a:rPr lang="en-US" dirty="0"/>
+              <a:t>@After – Run after @Test, public void</a:t>
+            </a:r>
+          </a:p>
+          <a:p>
+            <a:r>
+              <a:rPr lang="en-US" dirty="0"/>
+              <a:t>@Test – This is the test method to run, public </a:t>
+            </a:r>
+            <a:r>
+              <a:rPr lang="en-US" dirty="0" smtClean="0"/>
+              <a:t>void</a:t>
+            </a:r>
+          </a:p>
+          <a:p>
+            <a:endParaRPr lang="en-CA" dirty="0" smtClean="0"/>
           </a:p>
           <a:p>
             <a:endParaRPr lang="en-CA" dirty="0"/>
@@ -7579,10 +7634,18 @@
           <a:lstStyle/>
           <a:p>
             <a:r>
-              <a:rPr lang="en-US" altLang="en-US" dirty="0"/>
-              <a:t>Assert methods</a:t>
-            </a:r>
-            <a:endParaRPr lang="en-CA" dirty="0"/>
+              <a:rPr lang="en-US" altLang="zh-CN" dirty="0" smtClean="0"/>
+              <a:t>Code</a:t>
+            </a:r>
+            <a:r>
+              <a:rPr lang="zh-CN" altLang="en-US" dirty="0" smtClean="0"/>
+              <a:t> </a:t>
+            </a:r>
+            <a:r>
+              <a:rPr lang="en-US" altLang="zh-CN" dirty="0" smtClean="0"/>
+              <a:t>Coverage</a:t>
+            </a:r>
+            <a:endParaRPr lang="en-US" dirty="0"/>
           </a:p>
         </p:txBody>
       </p:sp>
@@ -7598,260 +7661,65 @@
         </p:nvSpPr>
         <p:spPr/>
         <p:txBody>
-          <a:bodyPr>
-            <a:normAutofit fontScale="92500" lnSpcReduction="10000"/>
-          </a:bodyPr>
+          <a:bodyPr/>
           <a:lstStyle/>
           <a:p>
-            <a:pPr>
-              <a:lnSpc>
-                <a:spcPct val="90000"/>
-              </a:lnSpc>
-            </a:pPr>
-            <a:r>
-              <a:rPr lang="en-US" altLang="en-US" dirty="0" err="1"/>
-              <a:t>assertTrue</a:t>
-            </a:r>
-            <a:r>
-              <a:rPr lang="en-US" altLang="en-US" dirty="0"/>
-              <a:t>(String </a:t>
-            </a:r>
-            <a:r>
-              <a:rPr lang="en-US" altLang="en-US" i="1" dirty="0"/>
-              <a:t>message</a:t>
-            </a:r>
-            <a:r>
-              <a:rPr lang="en-US" altLang="en-US" dirty="0"/>
-              <a:t>, Boolean </a:t>
-            </a:r>
-            <a:r>
-              <a:rPr lang="en-US" altLang="en-US" i="1" dirty="0"/>
-              <a:t>test</a:t>
-            </a:r>
-            <a:r>
-              <a:rPr lang="en-US" altLang="en-US" dirty="0"/>
-              <a:t>)</a:t>
-            </a:r>
-          </a:p>
-          <a:p>
-            <a:pPr>
-              <a:lnSpc>
-                <a:spcPct val="90000"/>
-              </a:lnSpc>
-            </a:pPr>
-            <a:r>
-              <a:rPr lang="en-US" altLang="en-US" dirty="0" err="1"/>
-              <a:t>assertFalse</a:t>
-            </a:r>
-            <a:r>
-              <a:rPr lang="en-US" altLang="en-US" dirty="0"/>
-              <a:t>(String </a:t>
-            </a:r>
-            <a:r>
-              <a:rPr lang="en-US" altLang="en-US" i="1" dirty="0"/>
-              <a:t>message</a:t>
-            </a:r>
-            <a:r>
-              <a:rPr lang="en-US" altLang="en-US" dirty="0"/>
-              <a:t>, Boolean </a:t>
-            </a:r>
-            <a:r>
-              <a:rPr lang="en-US" altLang="en-US" i="1" dirty="0"/>
-              <a:t>test</a:t>
-            </a:r>
-            <a:r>
-              <a:rPr lang="en-US" altLang="en-US" dirty="0"/>
-              <a:t>)</a:t>
-            </a:r>
-          </a:p>
-          <a:p>
-            <a:pPr>
-              <a:lnSpc>
-                <a:spcPct val="90000"/>
-              </a:lnSpc>
-            </a:pPr>
-            <a:r>
-              <a:rPr lang="en-US" altLang="en-US" dirty="0" err="1"/>
-              <a:t>assertNull</a:t>
-            </a:r>
-            <a:r>
-              <a:rPr lang="en-US" altLang="en-US" dirty="0"/>
-              <a:t>(String </a:t>
-            </a:r>
-            <a:r>
-              <a:rPr lang="en-US" altLang="en-US" i="1" dirty="0"/>
-              <a:t>message</a:t>
-            </a:r>
-            <a:r>
-              <a:rPr lang="en-US" altLang="en-US" dirty="0"/>
-              <a:t>, Object </a:t>
-            </a:r>
-            <a:r>
-              <a:rPr lang="en-US" altLang="en-US" i="1" dirty="0"/>
-              <a:t>object</a:t>
-            </a:r>
-            <a:r>
-              <a:rPr lang="en-US" altLang="en-US" dirty="0"/>
-              <a:t>)</a:t>
-            </a:r>
-          </a:p>
-          <a:p>
-            <a:pPr>
-              <a:lnSpc>
-                <a:spcPct val="90000"/>
-              </a:lnSpc>
-            </a:pPr>
-            <a:r>
-              <a:rPr lang="en-US" altLang="en-US" dirty="0" err="1"/>
-              <a:t>assertNotNull</a:t>
-            </a:r>
-            <a:r>
-              <a:rPr lang="en-US" altLang="en-US" dirty="0"/>
-              <a:t>(String </a:t>
-            </a:r>
-            <a:r>
-              <a:rPr lang="en-US" altLang="en-US" i="1" dirty="0"/>
-              <a:t>message</a:t>
-            </a:r>
-            <a:r>
-              <a:rPr lang="en-US" altLang="en-US" dirty="0"/>
-              <a:t>, Object </a:t>
-            </a:r>
-            <a:r>
-              <a:rPr lang="en-US" altLang="en-US" i="1" dirty="0"/>
-              <a:t>object</a:t>
-            </a:r>
-            <a:r>
-              <a:rPr lang="en-US" altLang="en-US" dirty="0"/>
-              <a:t>) </a:t>
-            </a:r>
-          </a:p>
-          <a:p>
-            <a:pPr>
-              <a:lnSpc>
-                <a:spcPct val="90000"/>
-              </a:lnSpc>
-            </a:pPr>
-            <a:r>
-              <a:rPr lang="en-US" altLang="en-US" dirty="0" err="1"/>
-              <a:t>assertEquals</a:t>
-            </a:r>
-            <a:r>
-              <a:rPr lang="en-US" altLang="en-US" dirty="0"/>
-              <a:t>(String </a:t>
-            </a:r>
-            <a:r>
-              <a:rPr lang="en-US" altLang="en-US" i="1" dirty="0"/>
-              <a:t>message</a:t>
-            </a:r>
-            <a:r>
-              <a:rPr lang="en-US" altLang="en-US" dirty="0"/>
-              <a:t>, Object </a:t>
-            </a:r>
-            <a:r>
-              <a:rPr lang="en-US" altLang="en-US" i="1" dirty="0"/>
-              <a:t>expected</a:t>
-            </a:r>
-            <a:r>
-              <a:rPr lang="en-US" altLang="en-US" dirty="0"/>
-              <a:t>, Object </a:t>
-            </a:r>
-            <a:r>
-              <a:rPr lang="en-US" altLang="en-US" i="1" dirty="0"/>
-              <a:t>actual</a:t>
-            </a:r>
-            <a:r>
-              <a:rPr lang="en-US" altLang="en-US" dirty="0"/>
-              <a:t>) (uses equals method)</a:t>
-            </a:r>
-          </a:p>
-          <a:p>
-            <a:pPr>
-              <a:lnSpc>
-                <a:spcPct val="90000"/>
-              </a:lnSpc>
-            </a:pPr>
-            <a:r>
-              <a:rPr lang="en-US" altLang="en-US" dirty="0" err="1"/>
-              <a:t>assertSame</a:t>
-            </a:r>
-            <a:r>
-              <a:rPr lang="en-US" altLang="en-US" dirty="0"/>
-              <a:t>(String </a:t>
-            </a:r>
-            <a:r>
-              <a:rPr lang="en-US" altLang="en-US" i="1" dirty="0"/>
-              <a:t>message</a:t>
-            </a:r>
-            <a:r>
-              <a:rPr lang="en-US" altLang="en-US" dirty="0"/>
-              <a:t>, Object </a:t>
-            </a:r>
-            <a:r>
-              <a:rPr lang="en-US" altLang="en-US" i="1" dirty="0"/>
-              <a:t>expected</a:t>
-            </a:r>
-            <a:r>
-              <a:rPr lang="en-US" altLang="en-US" dirty="0"/>
-              <a:t>, Object </a:t>
-            </a:r>
-            <a:r>
-              <a:rPr lang="en-US" altLang="en-US" i="1" dirty="0"/>
-              <a:t>actual</a:t>
-            </a:r>
-            <a:r>
-              <a:rPr lang="en-US" altLang="en-US" dirty="0"/>
-              <a:t>) (uses == operator)</a:t>
-            </a:r>
-          </a:p>
-          <a:p>
-            <a:pPr>
-              <a:lnSpc>
-                <a:spcPct val="90000"/>
-              </a:lnSpc>
-            </a:pPr>
-            <a:r>
-              <a:rPr lang="en-US" altLang="en-US" dirty="0" err="1"/>
-              <a:t>assertNotSame</a:t>
-            </a:r>
-            <a:r>
-              <a:rPr lang="en-US" altLang="en-US" dirty="0"/>
-              <a:t>(String </a:t>
-            </a:r>
-            <a:r>
-              <a:rPr lang="en-US" altLang="en-US" i="1" dirty="0"/>
-              <a:t>message</a:t>
-            </a:r>
-            <a:r>
-              <a:rPr lang="en-US" altLang="en-US" dirty="0"/>
-              <a:t>, Object </a:t>
-            </a:r>
-            <a:r>
-              <a:rPr lang="en-US" altLang="en-US" i="1" dirty="0"/>
-              <a:t>expected</a:t>
-            </a:r>
-            <a:r>
-              <a:rPr lang="en-US" altLang="en-US" dirty="0"/>
-              <a:t>, Object </a:t>
-            </a:r>
-            <a:r>
-              <a:rPr lang="en-US" altLang="en-US" i="1" dirty="0"/>
-              <a:t>actual</a:t>
-            </a:r>
-            <a:r>
-              <a:rPr lang="en-US" altLang="en-US" dirty="0"/>
-              <a:t>)</a:t>
-            </a:r>
-          </a:p>
-          <a:p>
-            <a:endParaRPr lang="en-CA" dirty="0"/>
-          </a:p>
-        </p:txBody>
-      </p:sp>
+            <a:r>
+              <a:rPr lang="en-US" dirty="0" smtClean="0">
+                <a:hlinkClick r:id="rId2" tooltip="EMMA (code coverage tool)"/>
+              </a:rPr>
+              <a:t>EMMA</a:t>
+            </a:r>
+            <a:endParaRPr lang="en-US" dirty="0" smtClean="0"/>
+          </a:p>
+          <a:p>
+            <a:r>
+              <a:rPr lang="en-US" dirty="0">
+                <a:hlinkClick r:id="rId3"/>
+              </a:rPr>
+              <a:t>http://www.eclemma.org/jacoco</a:t>
+            </a:r>
+            <a:r>
+              <a:rPr lang="en-US" dirty="0" smtClean="0">
+                <a:hlinkClick r:id="rId3"/>
+              </a:rPr>
+              <a:t>/</a:t>
+            </a:r>
+            <a:endParaRPr lang="en-US" b="1" dirty="0" smtClean="0"/>
+          </a:p>
+          <a:p>
+            <a:endParaRPr lang="en-US" dirty="0" smtClean="0"/>
+          </a:p>
+        </p:txBody>
+      </p:sp>
+      <p:pic>
+        <p:nvPicPr>
+          <p:cNvPr id="4" name="Picture 3"/>
+          <p:cNvPicPr>
+            <a:picLocks noChangeAspect="1"/>
+          </p:cNvPicPr>
+          <p:nvPr/>
+        </p:nvPicPr>
+        <p:blipFill>
+          <a:blip r:embed="rId4"/>
+          <a:stretch>
+            <a:fillRect/>
+          </a:stretch>
+        </p:blipFill>
+        <p:spPr>
+          <a:xfrm>
+            <a:off x="499533" y="3919310"/>
+            <a:ext cx="7989595" cy="1880356"/>
+          </a:xfrm>
+          <a:prstGeom prst="rect">
+            <a:avLst/>
+          </a:prstGeom>
+        </p:spPr>
+      </p:pic>
     </p:spTree>
     <p:extLst>
       <p:ext uri="{BB962C8B-B14F-4D97-AF65-F5344CB8AC3E}">
-        <p14:creationId xmlns:p14="http://schemas.microsoft.com/office/powerpoint/2010/main" val="2553841228"/>
+        <p14:creationId xmlns:p14="http://schemas.microsoft.com/office/powerpoint/2010/main" val="224373326"/>
       </p:ext>
     </p:extLst>
   </p:cSld>
@@ -7894,10 +7762,10 @@
           <a:lstStyle/>
           <a:p>
             <a:r>
-              <a:rPr lang="en-CA" b="1"/>
-              <a:t>XPath in Selenium</a:t>
-            </a:r>
-            <a:endParaRPr lang="en-CA"/>
+              <a:rPr lang="en-US" altLang="en-US" dirty="0"/>
+              <a:t>Assert methods</a:t>
+            </a:r>
+            <a:endParaRPr lang="en-CA" dirty="0"/>
           </a:p>
         </p:txBody>
       </p:sp>
@@ -7913,20 +7781,260 @@
         </p:nvSpPr>
         <p:spPr/>
         <p:txBody>
-          <a:bodyPr/>
+          <a:bodyPr>
+            <a:normAutofit fontScale="92500" lnSpcReduction="10000"/>
+          </a:bodyPr>
           <a:lstStyle/>
           <a:p>
-            <a:r>
-              <a:rPr lang="en-CA" dirty="0"/>
-              <a:t>http://www.guru99.com/xpath-selenium.html</a:t>
-            </a:r>
+            <a:pPr>
+              <a:lnSpc>
+                <a:spcPct val="90000"/>
+              </a:lnSpc>
+            </a:pPr>
+            <a:r>
+              <a:rPr lang="en-US" altLang="en-US" dirty="0" err="1"/>
+              <a:t>assertTrue</a:t>
+            </a:r>
+            <a:r>
+              <a:rPr lang="en-US" altLang="en-US" dirty="0"/>
+              <a:t>(String </a:t>
+            </a:r>
+            <a:r>
+              <a:rPr lang="en-US" altLang="en-US" i="1" dirty="0"/>
+              <a:t>message</a:t>
+            </a:r>
+            <a:r>
+              <a:rPr lang="en-US" altLang="en-US" dirty="0"/>
+              <a:t>, Boolean </a:t>
+            </a:r>
+            <a:r>
+              <a:rPr lang="en-US" altLang="en-US" i="1" dirty="0"/>
+              <a:t>test</a:t>
+            </a:r>
+            <a:r>
+              <a:rPr lang="en-US" altLang="en-US" dirty="0"/>
+              <a:t>)</a:t>
+            </a:r>
+          </a:p>
+          <a:p>
+            <a:pPr>
+              <a:lnSpc>
+                <a:spcPct val="90000"/>
+              </a:lnSpc>
+            </a:pPr>
+            <a:r>
+              <a:rPr lang="en-US" altLang="en-US" dirty="0" err="1"/>
+              <a:t>assertFalse</a:t>
+            </a:r>
+            <a:r>
+              <a:rPr lang="en-US" altLang="en-US" dirty="0"/>
+              <a:t>(String </a:t>
+            </a:r>
+            <a:r>
+              <a:rPr lang="en-US" altLang="en-US" i="1" dirty="0"/>
+              <a:t>message</a:t>
+            </a:r>
+            <a:r>
+              <a:rPr lang="en-US" altLang="en-US" dirty="0"/>
+              <a:t>, Boolean </a:t>
+            </a:r>
+            <a:r>
+              <a:rPr lang="en-US" altLang="en-US" i="1" dirty="0"/>
+              <a:t>test</a:t>
+            </a:r>
+            <a:r>
+              <a:rPr lang="en-US" altLang="en-US" dirty="0"/>
+              <a:t>)</a:t>
+            </a:r>
+          </a:p>
+          <a:p>
+            <a:pPr>
+              <a:lnSpc>
+                <a:spcPct val="90000"/>
+              </a:lnSpc>
+            </a:pPr>
+            <a:r>
+              <a:rPr lang="en-US" altLang="en-US" dirty="0" err="1"/>
+              <a:t>assertNull</a:t>
+            </a:r>
+            <a:r>
+              <a:rPr lang="en-US" altLang="en-US" dirty="0"/>
+              <a:t>(String </a:t>
+            </a:r>
+            <a:r>
+              <a:rPr lang="en-US" altLang="en-US" i="1" dirty="0"/>
+              <a:t>message</a:t>
+            </a:r>
+            <a:r>
+              <a:rPr lang="en-US" altLang="en-US" dirty="0"/>
+              <a:t>, Object </a:t>
+            </a:r>
+            <a:r>
+              <a:rPr lang="en-US" altLang="en-US" i="1" dirty="0"/>
+              <a:t>object</a:t>
+            </a:r>
+            <a:r>
+              <a:rPr lang="en-US" altLang="en-US" dirty="0"/>
+              <a:t>)</a:t>
+            </a:r>
+          </a:p>
+          <a:p>
+            <a:pPr>
+              <a:lnSpc>
+                <a:spcPct val="90000"/>
+              </a:lnSpc>
+            </a:pPr>
+            <a:r>
+              <a:rPr lang="en-US" altLang="en-US" dirty="0" err="1"/>
+              <a:t>assertNotNull</a:t>
+            </a:r>
+            <a:r>
+              <a:rPr lang="en-US" altLang="en-US" dirty="0"/>
+              <a:t>(String </a:t>
+            </a:r>
+            <a:r>
+              <a:rPr lang="en-US" altLang="en-US" i="1" dirty="0"/>
+              <a:t>message</a:t>
+            </a:r>
+            <a:r>
+              <a:rPr lang="en-US" altLang="en-US" dirty="0"/>
+              <a:t>, Object </a:t>
+            </a:r>
+            <a:r>
+              <a:rPr lang="en-US" altLang="en-US" i="1" dirty="0"/>
+              <a:t>object</a:t>
+            </a:r>
+            <a:r>
+              <a:rPr lang="en-US" altLang="en-US" dirty="0"/>
+              <a:t>) </a:t>
+            </a:r>
+          </a:p>
+          <a:p>
+            <a:pPr>
+              <a:lnSpc>
+                <a:spcPct val="90000"/>
+              </a:lnSpc>
+            </a:pPr>
+            <a:r>
+              <a:rPr lang="en-US" altLang="en-US" dirty="0" err="1"/>
+              <a:t>assertEquals</a:t>
+            </a:r>
+            <a:r>
+              <a:rPr lang="en-US" altLang="en-US" dirty="0"/>
+              <a:t>(String </a:t>
+            </a:r>
+            <a:r>
+              <a:rPr lang="en-US" altLang="en-US" i="1" dirty="0"/>
+              <a:t>message</a:t>
+            </a:r>
+            <a:r>
+              <a:rPr lang="en-US" altLang="en-US" dirty="0"/>
+              <a:t>, Object </a:t>
+            </a:r>
+            <a:r>
+              <a:rPr lang="en-US" altLang="en-US" i="1" dirty="0"/>
+              <a:t>expected</a:t>
+            </a:r>
+            <a:r>
+              <a:rPr lang="en-US" altLang="en-US" dirty="0"/>
+              <a:t>, Object </a:t>
+            </a:r>
+            <a:r>
+              <a:rPr lang="en-US" altLang="en-US" i="1" dirty="0"/>
+              <a:t>actual</a:t>
+            </a:r>
+            <a:r>
+              <a:rPr lang="en-US" altLang="en-US" dirty="0"/>
+              <a:t>) (uses equals method)</a:t>
+            </a:r>
+          </a:p>
+          <a:p>
+            <a:pPr>
+              <a:lnSpc>
+                <a:spcPct val="90000"/>
+              </a:lnSpc>
+            </a:pPr>
+            <a:r>
+              <a:rPr lang="en-US" altLang="en-US" dirty="0" err="1"/>
+              <a:t>assertSame</a:t>
+            </a:r>
+            <a:r>
+              <a:rPr lang="en-US" altLang="en-US" dirty="0"/>
+              <a:t>(String </a:t>
+            </a:r>
+            <a:r>
+              <a:rPr lang="en-US" altLang="en-US" i="1" dirty="0"/>
+              <a:t>message</a:t>
+            </a:r>
+            <a:r>
+              <a:rPr lang="en-US" altLang="en-US" dirty="0"/>
+              <a:t>, Object </a:t>
+            </a:r>
+            <a:r>
+              <a:rPr lang="en-US" altLang="en-US" i="1" dirty="0"/>
+              <a:t>expected</a:t>
+            </a:r>
+            <a:r>
+              <a:rPr lang="en-US" altLang="en-US" dirty="0"/>
+              <a:t>, Object </a:t>
+            </a:r>
+            <a:r>
+              <a:rPr lang="en-US" altLang="en-US" i="1" dirty="0"/>
+              <a:t>actual</a:t>
+            </a:r>
+            <a:r>
+              <a:rPr lang="en-US" altLang="en-US" dirty="0"/>
+              <a:t>) (uses == operator)</a:t>
+            </a:r>
+          </a:p>
+          <a:p>
+            <a:pPr>
+              <a:lnSpc>
+                <a:spcPct val="90000"/>
+              </a:lnSpc>
+            </a:pPr>
+            <a:r>
+              <a:rPr lang="en-US" altLang="en-US" dirty="0" err="1"/>
+              <a:t>assertNotSame</a:t>
+            </a:r>
+            <a:r>
+              <a:rPr lang="en-US" altLang="en-US" dirty="0"/>
+              <a:t>(String </a:t>
+            </a:r>
+            <a:r>
+              <a:rPr lang="en-US" altLang="en-US" i="1" dirty="0"/>
+              <a:t>message</a:t>
+            </a:r>
+            <a:r>
+              <a:rPr lang="en-US" altLang="en-US" dirty="0"/>
+              <a:t>, Object </a:t>
+            </a:r>
+            <a:r>
+              <a:rPr lang="en-US" altLang="en-US" i="1" dirty="0"/>
+              <a:t>expected</a:t>
+            </a:r>
+            <a:r>
+              <a:rPr lang="en-US" altLang="en-US" dirty="0"/>
+              <a:t>, Object </a:t>
+            </a:r>
+            <a:r>
+              <a:rPr lang="en-US" altLang="en-US" i="1" dirty="0"/>
+              <a:t>actual</a:t>
+            </a:r>
+            <a:r>
+              <a:rPr lang="en-US" altLang="en-US" dirty="0"/>
+              <a:t>)</a:t>
+            </a:r>
+          </a:p>
+          <a:p>
+            <a:endParaRPr lang="en-CA" dirty="0"/>
           </a:p>
         </p:txBody>
       </p:sp>
     </p:spTree>
     <p:extLst>
       <p:ext uri="{BB962C8B-B14F-4D97-AF65-F5344CB8AC3E}">
-        <p14:creationId xmlns:p14="http://schemas.microsoft.com/office/powerpoint/2010/main" val="2300223916"/>
+        <p14:creationId xmlns:p14="http://schemas.microsoft.com/office/powerpoint/2010/main" val="2553841228"/>
       </p:ext>
     </p:extLst>
   </p:cSld>
@@ -8151,6 +8259,177 @@
           <a:lstStyle/>
           <a:p>
             <a:r>
+              <a:rPr lang="en-CA" b="1"/>
+              <a:t>XPath in Selenium</a:t>
+            </a:r>
+            <a:endParaRPr lang="en-CA"/>
+          </a:p>
+        </p:txBody>
+      </p:sp>
+      <p:sp>
+        <p:nvSpPr>
+          <p:cNvPr id="3" name="Content Placeholder 2"/>
+          <p:cNvSpPr>
+            <a:spLocks noGrp="1"/>
+          </p:cNvSpPr>
+          <p:nvPr>
+            <p:ph idx="1"/>
+          </p:nvPr>
+        </p:nvSpPr>
+        <p:spPr/>
+        <p:txBody>
+          <a:bodyPr/>
+          <a:lstStyle/>
+          <a:p>
+            <a:r>
+              <a:rPr lang="en-CA" dirty="0"/>
+              <a:t>http://www.guru99.com/xpath-selenium.html</a:t>
+            </a:r>
+          </a:p>
+        </p:txBody>
+      </p:sp>
+    </p:spTree>
+    <p:extLst>
+      <p:ext uri="{BB962C8B-B14F-4D97-AF65-F5344CB8AC3E}">
+        <p14:creationId xmlns:p14="http://schemas.microsoft.com/office/powerpoint/2010/main" val="2300223916"/>
+      </p:ext>
+    </p:extLst>
+  </p:cSld>
+  <p:clrMapOvr>
+    <a:masterClrMapping/>
+  </p:clrMapOvr>
+</p:sld>
+</file>
+
+<file path=ppt/slides/slide21.xml><?xml version="1.0" encoding="utf-8"?>
+<p:sld xmlns:a="http://schemas.openxmlformats.org/drawingml/2006/main" xmlns:r="http://schemas.openxmlformats.org/officeDocument/2006/relationships" xmlns:p="http://schemas.openxmlformats.org/presentationml/2006/main">
+  <p:cSld>
+    <p:spTree>
+      <p:nvGrpSpPr>
+        <p:cNvPr id="1" name=""/>
+        <p:cNvGrpSpPr/>
+        <p:nvPr/>
+      </p:nvGrpSpPr>
+      <p:grpSpPr>
+        <a:xfrm>
+          <a:off x="0" y="0"/>
+          <a:ext cx="0" cy="0"/>
+          <a:chOff x="0" y="0"/>
+          <a:chExt cx="0" cy="0"/>
+        </a:xfrm>
+      </p:grpSpPr>
+      <p:sp>
+        <p:nvSpPr>
+          <p:cNvPr id="2" name="Title 1"/>
+          <p:cNvSpPr>
+            <a:spLocks noGrp="1"/>
+          </p:cNvSpPr>
+          <p:nvPr>
+            <p:ph type="title"/>
+          </p:nvPr>
+        </p:nvSpPr>
+        <p:spPr/>
+        <p:txBody>
+          <a:bodyPr/>
+          <a:lstStyle/>
+          <a:p>
+            <a:r>
+              <a:rPr lang="en-US" dirty="0" smtClean="0"/>
+              <a:t>Selenium</a:t>
+            </a:r>
+            <a:endParaRPr lang="en-US" dirty="0"/>
+          </a:p>
+        </p:txBody>
+      </p:sp>
+      <p:sp>
+        <p:nvSpPr>
+          <p:cNvPr id="3" name="Content Placeholder 2"/>
+          <p:cNvSpPr>
+            <a:spLocks noGrp="1"/>
+          </p:cNvSpPr>
+          <p:nvPr>
+            <p:ph idx="1"/>
+          </p:nvPr>
+        </p:nvSpPr>
+        <p:spPr/>
+        <p:txBody>
+          <a:bodyPr/>
+          <a:lstStyle/>
+          <a:p>
+            <a:r>
+              <a:rPr lang="en-US" dirty="0" smtClean="0"/>
+              <a:t>Selenium IDE</a:t>
+            </a:r>
+          </a:p>
+          <a:p>
+            <a:r>
+              <a:rPr lang="en-US" dirty="0" err="1" smtClean="0"/>
+              <a:t>Xpath</a:t>
+            </a:r>
+            <a:endParaRPr lang="en-US" dirty="0" smtClean="0"/>
+          </a:p>
+          <a:p>
+            <a:r>
+              <a:rPr lang="en-US" smtClean="0"/>
+              <a:t>CSS selector</a:t>
+            </a:r>
+            <a:endParaRPr lang="en-US" dirty="0" smtClean="0"/>
+          </a:p>
+          <a:p>
+            <a:r>
+              <a:rPr lang="en-US" dirty="0" smtClean="0"/>
+              <a:t>Demo</a:t>
+            </a:r>
+            <a:endParaRPr lang="en-US" dirty="0"/>
+          </a:p>
+        </p:txBody>
+      </p:sp>
+    </p:spTree>
+    <p:extLst>
+      <p:ext uri="{BB962C8B-B14F-4D97-AF65-F5344CB8AC3E}">
+        <p14:creationId xmlns:p14="http://schemas.microsoft.com/office/powerpoint/2010/main" val="105352868"/>
+      </p:ext>
+    </p:extLst>
+  </p:cSld>
+  <p:clrMapOvr>
+    <a:masterClrMapping/>
+  </p:clrMapOvr>
+</p:sld>
+</file>
+
+<file path=ppt/slides/slide22.xml><?xml version="1.0" encoding="utf-8"?>
+<p:sld xmlns:a="http://schemas.openxmlformats.org/drawingml/2006/main" xmlns:r="http://schemas.openxmlformats.org/officeDocument/2006/relationships" xmlns:p="http://schemas.openxmlformats.org/presentationml/2006/main">
+  <p:cSld>
+    <p:spTree>
+      <p:nvGrpSpPr>
+        <p:cNvPr id="1" name=""/>
+        <p:cNvGrpSpPr/>
+        <p:nvPr/>
+      </p:nvGrpSpPr>
+      <p:grpSpPr>
+        <a:xfrm>
+          <a:off x="0" y="0"/>
+          <a:ext cx="0" cy="0"/>
+          <a:chOff x="0" y="0"/>
+          <a:chExt cx="0" cy="0"/>
+        </a:xfrm>
+      </p:grpSpPr>
+      <p:sp>
+        <p:nvSpPr>
+          <p:cNvPr id="2" name="Title 1"/>
+          <p:cNvSpPr>
+            <a:spLocks noGrp="1"/>
+          </p:cNvSpPr>
+          <p:nvPr>
+            <p:ph type="title"/>
+          </p:nvPr>
+        </p:nvSpPr>
+        <p:spPr/>
+        <p:txBody>
+          <a:bodyPr/>
+          <a:lstStyle/>
+          <a:p>
+            <a:r>
               <a:rPr lang="en-CA" b="1" dirty="0"/>
               <a:t>What is XPath</a:t>
             </a:r>
@@ -8194,7 +8473,7 @@
 </p:sld>
 </file>
 
-<file path=ppt/slides/slide21.xml><?xml version="1.0" encoding="utf-8"?>
+<file path=ppt/slides/slide23.xml><?xml version="1.0" encoding="utf-8"?>
 <p:sld xmlns:a="http://schemas.openxmlformats.org/drawingml/2006/main" xmlns:r="http://schemas.openxmlformats.org/officeDocument/2006/relationships" xmlns:p="http://schemas.openxmlformats.org/presentationml/2006/main">
   <p:cSld>
     <p:spTree>
@@ -8423,7 +8702,7 @@
 </p:sld>
 </file>
 
-<file path=ppt/slides/slide22.xml><?xml version="1.0" encoding="utf-8"?>
+<file path=ppt/slides/slide24.xml><?xml version="1.0" encoding="utf-8"?>
 <p:sld xmlns:a="http://schemas.openxmlformats.org/drawingml/2006/main" xmlns:r="http://schemas.openxmlformats.org/officeDocument/2006/relationships" xmlns:p="http://schemas.openxmlformats.org/presentationml/2006/main">
   <p:cSld>
     <p:spTree>
@@ -8527,7 +8806,7 @@
 </p:sld>
 </file>
 
-<file path=ppt/slides/slide23.xml><?xml version="1.0" encoding="utf-8"?>
+<file path=ppt/slides/slide25.xml><?xml version="1.0" encoding="utf-8"?>
 <p:sld xmlns:a="http://schemas.openxmlformats.org/drawingml/2006/main" xmlns:r="http://schemas.openxmlformats.org/officeDocument/2006/relationships" xmlns:p="http://schemas.openxmlformats.org/presentationml/2006/main">
   <p:cSld>
     <p:spTree>
@@ -8631,7 +8910,7 @@
 </p:sld>
 </file>
 
-<file path=ppt/slides/slide24.xml><?xml version="1.0" encoding="utf-8"?>
+<file path=ppt/slides/slide26.xml><?xml version="1.0" encoding="utf-8"?>
 <p:sld xmlns:a="http://schemas.openxmlformats.org/drawingml/2006/main" xmlns:r="http://schemas.openxmlformats.org/officeDocument/2006/relationships" xmlns:p="http://schemas.openxmlformats.org/presentationml/2006/main">
   <p:cSld>
     <p:spTree>
@@ -8663,7 +8942,7 @@
           <a:bodyPr/>
           <a:lstStyle/>
           <a:p>
-            <a:endParaRPr lang="en-CA"/>
+            <a:endParaRPr lang="en-CA" dirty="0"/>
           </a:p>
         </p:txBody>
       </p:sp>
@@ -8693,6 +8972,116 @@
     <p:extLst>
       <p:ext uri="{BB962C8B-B14F-4D97-AF65-F5344CB8AC3E}">
         <p14:creationId xmlns:p14="http://schemas.microsoft.com/office/powerpoint/2010/main" val="3515789281"/>
+      </p:ext>
+    </p:extLst>
+  </p:cSld>
+  <p:clrMapOvr>
+    <a:masterClrMapping/>
+  </p:clrMapOvr>
+</p:sld>
+</file>
+
+<file path=ppt/slides/slide27.xml><?xml version="1.0" encoding="utf-8"?>
+<p:sld xmlns:a="http://schemas.openxmlformats.org/drawingml/2006/main" xmlns:r="http://schemas.openxmlformats.org/officeDocument/2006/relationships" xmlns:p="http://schemas.openxmlformats.org/presentationml/2006/main">
+  <p:cSld>
+    <p:spTree>
+      <p:nvGrpSpPr>
+        <p:cNvPr id="1" name=""/>
+        <p:cNvGrpSpPr/>
+        <p:nvPr/>
+      </p:nvGrpSpPr>
+      <p:grpSpPr>
+        <a:xfrm>
+          <a:off x="0" y="0"/>
+          <a:ext cx="0" cy="0"/>
+          <a:chOff x="0" y="0"/>
+          <a:chExt cx="0" cy="0"/>
+        </a:xfrm>
+      </p:grpSpPr>
+      <p:sp>
+        <p:nvSpPr>
+          <p:cNvPr id="2" name="Title 1"/>
+          <p:cNvSpPr>
+            <a:spLocks noGrp="1"/>
+          </p:cNvSpPr>
+          <p:nvPr>
+            <p:ph type="title"/>
+          </p:nvPr>
+        </p:nvSpPr>
+        <p:spPr/>
+        <p:txBody>
+          <a:bodyPr/>
+          <a:lstStyle/>
+          <a:p>
+            <a:r>
+              <a:rPr lang="en-US" b="1" dirty="0"/>
+              <a:t>CSS </a:t>
+            </a:r>
+            <a:r>
+              <a:rPr lang="en-US" b="1" dirty="0" smtClean="0"/>
+              <a:t>Selector</a:t>
+            </a:r>
+            <a:endParaRPr lang="en-US" dirty="0"/>
+          </a:p>
+        </p:txBody>
+      </p:sp>
+      <p:sp>
+        <p:nvSpPr>
+          <p:cNvPr id="3" name="Content Placeholder 2"/>
+          <p:cNvSpPr>
+            <a:spLocks noGrp="1"/>
+          </p:cNvSpPr>
+          <p:nvPr>
+            <p:ph idx="1"/>
+          </p:nvPr>
+        </p:nvSpPr>
+        <p:spPr/>
+        <p:txBody>
+          <a:bodyPr/>
+          <a:lstStyle/>
+          <a:p>
+            <a:r>
+              <a:rPr lang="en-US" dirty="0">
+                <a:hlinkClick r:id="rId2"/>
+              </a:rPr>
+              <a:t>https://</a:t>
+            </a:r>
+            <a:r>
+              <a:rPr lang="en-US" dirty="0" smtClean="0">
+                <a:hlinkClick r:id="rId2"/>
+              </a:rPr>
+              <a:t>www.w3schools.com/cssref/trysel.asp</a:t>
+            </a:r>
+            <a:endParaRPr lang="en-US" dirty="0" smtClean="0"/>
+          </a:p>
+          <a:p>
+            <a:r>
+              <a:rPr lang="en-US" dirty="0"/>
+              <a:t>https://</a:t>
+            </a:r>
+            <a:r>
+              <a:rPr lang="en-US" dirty="0" err="1"/>
+              <a:t>saucelabs.com</a:t>
+            </a:r>
+            <a:r>
+              <a:rPr lang="en-US" dirty="0"/>
+              <a:t>/resources/articles/selenium-tips-</a:t>
+            </a:r>
+            <a:r>
+              <a:rPr lang="en-US" dirty="0" err="1"/>
+              <a:t>css</a:t>
+            </a:r>
+            <a:r>
+              <a:rPr lang="en-US" dirty="0"/>
+              <a:t>-selectors</a:t>
+            </a:r>
+          </a:p>
+        </p:txBody>
+      </p:sp>
+    </p:spTree>
+    <p:extLst>
+      <p:ext uri="{BB962C8B-B14F-4D97-AF65-F5344CB8AC3E}">
+        <p14:creationId xmlns:p14="http://schemas.microsoft.com/office/powerpoint/2010/main" val="1031393918"/>
       </p:ext>
     </p:extLst>
   </p:cSld>

</xml_diff>